<commit_message>
Added MySQL Model with ER diagram. Improved main.sql
</commit_message>
<xml_diff>
--- a/er-model.pptx
+++ b/er-model.pptx
@@ -104,6 +104,11 @@
       </a:defRPr>
     </a:lvl9pPr>
   </p:defaultTextStyle>
+  <p:extLst>
+    <p:ext uri="{EFAFB233-063F-42B5-8137-9DF3F51BA10A}">
+      <p15:sldGuideLst xmlns:p15="http://schemas.microsoft.com/office/powerpoint/2012/main"/>
+    </p:ext>
+  </p:extLst>
 </p:presentation>
 </file>
 
@@ -238,7 +243,7 @@
           <a:p>
             <a:fld id="{F1EB2276-C481-45B0-AF48-1860EC7DBEA9}" type="datetimeFigureOut">
               <a:rPr lang="en-US" smtClean="0"/>
-              <a:t>12/29/2014</a:t>
+              <a:t>12/30/2014</a:t>
             </a:fld>
             <a:endParaRPr lang="en-US"/>
           </a:p>
@@ -408,7 +413,7 @@
           <a:p>
             <a:fld id="{F1EB2276-C481-45B0-AF48-1860EC7DBEA9}" type="datetimeFigureOut">
               <a:rPr lang="en-US" smtClean="0"/>
-              <a:t>12/29/2014</a:t>
+              <a:t>12/30/2014</a:t>
             </a:fld>
             <a:endParaRPr lang="en-US"/>
           </a:p>
@@ -588,7 +593,7 @@
           <a:p>
             <a:fld id="{F1EB2276-C481-45B0-AF48-1860EC7DBEA9}" type="datetimeFigureOut">
               <a:rPr lang="en-US" smtClean="0"/>
-              <a:t>12/29/2014</a:t>
+              <a:t>12/30/2014</a:t>
             </a:fld>
             <a:endParaRPr lang="en-US"/>
           </a:p>
@@ -758,7 +763,7 @@
           <a:p>
             <a:fld id="{F1EB2276-C481-45B0-AF48-1860EC7DBEA9}" type="datetimeFigureOut">
               <a:rPr lang="en-US" smtClean="0"/>
-              <a:t>12/29/2014</a:t>
+              <a:t>12/30/2014</a:t>
             </a:fld>
             <a:endParaRPr lang="en-US"/>
           </a:p>
@@ -1004,7 +1009,7 @@
           <a:p>
             <a:fld id="{F1EB2276-C481-45B0-AF48-1860EC7DBEA9}" type="datetimeFigureOut">
               <a:rPr lang="en-US" smtClean="0"/>
-              <a:t>12/29/2014</a:t>
+              <a:t>12/30/2014</a:t>
             </a:fld>
             <a:endParaRPr lang="en-US"/>
           </a:p>
@@ -1236,7 +1241,7 @@
           <a:p>
             <a:fld id="{F1EB2276-C481-45B0-AF48-1860EC7DBEA9}" type="datetimeFigureOut">
               <a:rPr lang="en-US" smtClean="0"/>
-              <a:t>12/29/2014</a:t>
+              <a:t>12/30/2014</a:t>
             </a:fld>
             <a:endParaRPr lang="en-US"/>
           </a:p>
@@ -1603,7 +1608,7 @@
           <a:p>
             <a:fld id="{F1EB2276-C481-45B0-AF48-1860EC7DBEA9}" type="datetimeFigureOut">
               <a:rPr lang="en-US" smtClean="0"/>
-              <a:t>12/29/2014</a:t>
+              <a:t>12/30/2014</a:t>
             </a:fld>
             <a:endParaRPr lang="en-US"/>
           </a:p>
@@ -1721,7 +1726,7 @@
           <a:p>
             <a:fld id="{F1EB2276-C481-45B0-AF48-1860EC7DBEA9}" type="datetimeFigureOut">
               <a:rPr lang="en-US" smtClean="0"/>
-              <a:t>12/29/2014</a:t>
+              <a:t>12/30/2014</a:t>
             </a:fld>
             <a:endParaRPr lang="en-US"/>
           </a:p>
@@ -1816,7 +1821,7 @@
           <a:p>
             <a:fld id="{F1EB2276-C481-45B0-AF48-1860EC7DBEA9}" type="datetimeFigureOut">
               <a:rPr lang="en-US" smtClean="0"/>
-              <a:t>12/29/2014</a:t>
+              <a:t>12/30/2014</a:t>
             </a:fld>
             <a:endParaRPr lang="en-US"/>
           </a:p>
@@ -2093,7 +2098,7 @@
           <a:p>
             <a:fld id="{F1EB2276-C481-45B0-AF48-1860EC7DBEA9}" type="datetimeFigureOut">
               <a:rPr lang="en-US" smtClean="0"/>
-              <a:t>12/29/2014</a:t>
+              <a:t>12/30/2014</a:t>
             </a:fld>
             <a:endParaRPr lang="en-US"/>
           </a:p>
@@ -2346,7 +2351,7 @@
           <a:p>
             <a:fld id="{F1EB2276-C481-45B0-AF48-1860EC7DBEA9}" type="datetimeFigureOut">
               <a:rPr lang="en-US" smtClean="0"/>
-              <a:t>12/29/2014</a:t>
+              <a:t>12/30/2014</a:t>
             </a:fld>
             <a:endParaRPr lang="en-US"/>
           </a:p>
@@ -2559,7 +2564,7 @@
           <a:p>
             <a:fld id="{F1EB2276-C481-45B0-AF48-1860EC7DBEA9}" type="datetimeFigureOut">
               <a:rPr lang="en-US" smtClean="0"/>
-              <a:t>12/29/2014</a:t>
+              <a:t>12/30/2014</a:t>
             </a:fld>
             <a:endParaRPr lang="en-US"/>
           </a:p>
@@ -3016,8 +3021,8 @@
         </p:nvCxnSpPr>
         <p:spPr>
           <a:xfrm flipH="1">
-            <a:off x="-19756" y="1352051"/>
-            <a:ext cx="1145218" cy="0"/>
+            <a:off x="692458" y="1352051"/>
+            <a:ext cx="433004" cy="0"/>
           </a:xfrm>
           <a:prstGeom prst="line">
             <a:avLst/>
@@ -3046,8 +3051,8 @@
         </p:nvSpPr>
         <p:spPr>
           <a:xfrm>
-            <a:off x="257453" y="714652"/>
-            <a:ext cx="239697" cy="204187"/>
+            <a:off x="526454" y="1248138"/>
+            <a:ext cx="195547" cy="187252"/>
           </a:xfrm>
           <a:prstGeom prst="ellipse">
             <a:avLst/>
@@ -3086,7 +3091,7 @@
         </p:nvSpPr>
         <p:spPr>
           <a:xfrm>
-            <a:off x="3551068" y="1231776"/>
+            <a:off x="3660952" y="976353"/>
             <a:ext cx="2050741" cy="750162"/>
           </a:xfrm>
           <a:prstGeom prst="diamond">
@@ -3128,7 +3133,7 @@
         </p:nvSpPr>
         <p:spPr>
           <a:xfrm>
-            <a:off x="6320899" y="1322772"/>
+            <a:off x="6469880" y="1131594"/>
             <a:ext cx="1358283" cy="463030"/>
           </a:xfrm>
           <a:prstGeom prst="rect">
@@ -3172,9 +3177,9 @@
           <p:nvPr/>
         </p:nvCxnSpPr>
         <p:spPr>
-          <a:xfrm>
-            <a:off x="2483745" y="1352051"/>
-            <a:ext cx="1067323" cy="254806"/>
+          <a:xfrm flipV="1">
+            <a:off x="2483745" y="1351434"/>
+            <a:ext cx="1177207" cy="617"/>
           </a:xfrm>
           <a:prstGeom prst="line">
             <a:avLst/>
@@ -3205,9 +3210,9 @@
           <p:nvPr/>
         </p:nvCxnSpPr>
         <p:spPr>
-          <a:xfrm flipV="1">
-            <a:off x="5601809" y="1554287"/>
-            <a:ext cx="719090" cy="52570"/>
+          <a:xfrm>
+            <a:off x="5711693" y="1351434"/>
+            <a:ext cx="758187" cy="11675"/>
           </a:xfrm>
           <a:prstGeom prst="line">
             <a:avLst/>
@@ -3296,7 +3301,7 @@
         </p:nvSpPr>
         <p:spPr>
           <a:xfrm>
-            <a:off x="1487010" y="3980485"/>
+            <a:off x="1123252" y="4073932"/>
             <a:ext cx="1358283" cy="568171"/>
           </a:xfrm>
           <a:prstGeom prst="rect">
@@ -3338,7 +3343,7 @@
         </p:nvSpPr>
         <p:spPr>
           <a:xfrm>
-            <a:off x="1140782" y="2560633"/>
+            <a:off x="788110" y="2568605"/>
             <a:ext cx="2050741" cy="750162"/>
           </a:xfrm>
           <a:prstGeom prst="diamond">
@@ -3384,7 +3389,7 @@
         <p:spPr>
           <a:xfrm>
             <a:off x="1804604" y="1636136"/>
-            <a:ext cx="361549" cy="924497"/>
+            <a:ext cx="8877" cy="932469"/>
           </a:xfrm>
           <a:prstGeom prst="line">
             <a:avLst/>
@@ -3416,8 +3421,8 @@
         </p:nvCxnSpPr>
         <p:spPr>
           <a:xfrm flipH="1">
-            <a:off x="2166152" y="3310795"/>
-            <a:ext cx="1" cy="669690"/>
+            <a:off x="1802394" y="3318767"/>
+            <a:ext cx="11087" cy="755165"/>
           </a:xfrm>
           <a:prstGeom prst="line">
             <a:avLst/>
@@ -3533,8 +3538,8 @@
         </p:nvCxnSpPr>
         <p:spPr>
           <a:xfrm>
-            <a:off x="2845293" y="4264571"/>
-            <a:ext cx="219681" cy="1126724"/>
+            <a:off x="2481535" y="4358018"/>
+            <a:ext cx="583439" cy="1033277"/>
           </a:xfrm>
           <a:prstGeom prst="line">
             <a:avLst/>
@@ -3641,8 +3646,8 @@
         </p:nvCxnSpPr>
         <p:spPr>
           <a:xfrm>
-            <a:off x="7000041" y="1785802"/>
-            <a:ext cx="1173197" cy="1149912"/>
+            <a:off x="7149022" y="1594624"/>
+            <a:ext cx="1024216" cy="1341090"/>
           </a:xfrm>
           <a:prstGeom prst="line">
             <a:avLst/>
@@ -3742,14 +3747,14 @@
         <p:nvCxnSpPr>
           <p:cNvPr id="57" name="Straight Connector 56"/>
           <p:cNvCxnSpPr>
-            <a:endCxn id="31" idx="3"/>
+            <a:stCxn id="55" idx="1"/>
           </p:cNvCxnSpPr>
           <p:nvPr/>
         </p:nvCxnSpPr>
         <p:spPr>
           <a:xfrm flipH="1">
-            <a:off x="2845293" y="2779806"/>
-            <a:ext cx="761174" cy="1484765"/>
+            <a:off x="2555043" y="2754940"/>
+            <a:ext cx="1069222" cy="1603077"/>
           </a:xfrm>
           <a:prstGeom prst="line">
             <a:avLst/>
@@ -3781,8 +3786,8 @@
         </p:nvCxnSpPr>
         <p:spPr>
           <a:xfrm flipV="1">
-            <a:off x="5675006" y="1785802"/>
-            <a:ext cx="1325035" cy="969138"/>
+            <a:off x="5675006" y="1594624"/>
+            <a:ext cx="1474016" cy="1160316"/>
           </a:xfrm>
           <a:prstGeom prst="line">
             <a:avLst/>
@@ -3856,8 +3861,8 @@
         </p:nvCxnSpPr>
         <p:spPr>
           <a:xfrm flipV="1">
-            <a:off x="2845293" y="3522188"/>
-            <a:ext cx="1606772" cy="742383"/>
+            <a:off x="2481535" y="3522188"/>
+            <a:ext cx="1970530" cy="835830"/>
           </a:xfrm>
           <a:prstGeom prst="line">
             <a:avLst/>
@@ -3889,8 +3894,8 @@
         </p:nvCxnSpPr>
         <p:spPr>
           <a:xfrm flipV="1">
-            <a:off x="6502806" y="1785802"/>
-            <a:ext cx="497235" cy="1736386"/>
+            <a:off x="6502806" y="1594624"/>
+            <a:ext cx="646216" cy="1927564"/>
           </a:xfrm>
           <a:prstGeom prst="line">
             <a:avLst/>
@@ -4039,7 +4044,7 @@
         </p:nvSpPr>
         <p:spPr>
           <a:xfrm>
-            <a:off x="1487010" y="3689958"/>
+            <a:off x="1381034" y="3766464"/>
             <a:ext cx="470000" cy="261610"/>
           </a:xfrm>
           <a:prstGeom prst="rect">
@@ -4069,7 +4074,7 @@
         </p:nvSpPr>
         <p:spPr>
           <a:xfrm>
-            <a:off x="1546657" y="2017317"/>
+            <a:off x="1378733" y="2007327"/>
             <a:ext cx="470000" cy="261610"/>
           </a:xfrm>
           <a:prstGeom prst="rect">
@@ -4305,9 +4310,9 @@
           <p:nvPr/>
         </p:nvCxnSpPr>
         <p:spPr>
-          <a:xfrm flipV="1">
-            <a:off x="7679182" y="1435389"/>
-            <a:ext cx="645893" cy="118898"/>
+          <a:xfrm>
+            <a:off x="7828163" y="1363109"/>
+            <a:ext cx="496912" cy="72280"/>
           </a:xfrm>
           <a:prstGeom prst="line">
             <a:avLst/>
@@ -4474,8 +4479,8 @@
         </p:nvCxnSpPr>
         <p:spPr>
           <a:xfrm>
-            <a:off x="2845293" y="4264571"/>
-            <a:ext cx="2119457" cy="260848"/>
+            <a:off x="2481535" y="4358018"/>
+            <a:ext cx="2483215" cy="167401"/>
           </a:xfrm>
           <a:prstGeom prst="line">
             <a:avLst/>
@@ -4506,9 +4511,9 @@
           <p:nvPr/>
         </p:nvCxnSpPr>
         <p:spPr>
-          <a:xfrm flipH="1" flipV="1">
-            <a:off x="7000041" y="1785802"/>
-            <a:ext cx="15450" cy="2739617"/>
+          <a:xfrm flipV="1">
+            <a:off x="7015491" y="1594624"/>
+            <a:ext cx="133531" cy="2930795"/>
           </a:xfrm>
           <a:prstGeom prst="line">
             <a:avLst/>

</xml_diff>